<commit_message>
Andriod studio setup start update
</commit_message>
<xml_diff>
--- a/lectures materials/cross platform programming/3. Android studio setup.pptx
+++ b/lectures materials/cross platform programming/3. Android studio setup.pptx
@@ -5,7 +5,7 @@
     <p:sldMasterId id="2147483659" r:id="rId1"/>
   </p:sldMasterIdLst>
   <p:notesMasterIdLst>
-    <p:notesMasterId r:id="rId24"/>
+    <p:notesMasterId r:id="rId26"/>
   </p:notesMasterIdLst>
   <p:sldIdLst>
     <p:sldId id="256" r:id="rId2"/>
@@ -29,7 +29,9 @@
     <p:sldId id="299" r:id="rId20"/>
     <p:sldId id="300" r:id="rId21"/>
     <p:sldId id="301" r:id="rId22"/>
-    <p:sldId id="280" r:id="rId23"/>
+    <p:sldId id="302" r:id="rId23"/>
+    <p:sldId id="303" r:id="rId24"/>
+    <p:sldId id="280" r:id="rId25"/>
   </p:sldIdLst>
   <p:sldSz cx="9144000" cy="5143500" type="screen16x9"/>
   <p:notesSz cx="6858000" cy="9144000"/>
@@ -5600,6 +5602,13 @@
   <p:clrMapOvr>
     <a:masterClrMapping/>
   </p:clrMapOvr>
+  <p:timing>
+    <p:tnLst>
+      <p:par>
+        <p:cTn id="1" dur="indefinite" restart="never" nodeType="tmRoot"/>
+      </p:par>
+    </p:tnLst>
+  </p:timing>
 </p:sld>
 </file>
 
@@ -8057,6 +8066,13 @@
   <p:clrMapOvr>
     <a:masterClrMapping/>
   </p:clrMapOvr>
+  <p:timing>
+    <p:tnLst>
+      <p:par>
+        <p:cTn id="1" dur="indefinite" restart="never" nodeType="tmRoot"/>
+      </p:par>
+    </p:tnLst>
+  </p:timing>
 </p:sld>
 </file>
 
@@ -9519,6 +9535,460 @@
   <p:cSld>
     <p:spTree>
       <p:nvGrpSpPr>
+        <p:cNvPr id="1" name="">
+          <a:extLst>
+            <a:ext uri="{FF2B5EF4-FFF2-40B4-BE49-F238E27FC236}">
+              <a16:creationId xmlns:a16="http://schemas.microsoft.com/office/drawing/2014/main" xmlns="" id="{C2BCDF65-D003-983C-057A-96B83A5BA50B}"/>
+            </a:ext>
+          </a:extLst>
+        </p:cNvPr>
+        <p:cNvGrpSpPr/>
+        <p:nvPr/>
+      </p:nvGrpSpPr>
+      <p:grpSpPr>
+        <a:xfrm>
+          <a:off x="0" y="0"/>
+          <a:ext cx="0" cy="0"/>
+          <a:chOff x="0" y="0"/>
+          <a:chExt cx="0" cy="0"/>
+        </a:xfrm>
+      </p:grpSpPr>
+      <p:sp>
+        <p:nvSpPr>
+          <p:cNvPr id="2" name="Заголовок 1">
+            <a:extLst>
+              <a:ext uri="{FF2B5EF4-FFF2-40B4-BE49-F238E27FC236}">
+                <a16:creationId xmlns:a16="http://schemas.microsoft.com/office/drawing/2014/main" xmlns="" id="{F7EE2C49-3338-6EA9-6BA0-156C666F049A}"/>
+              </a:ext>
+            </a:extLst>
+          </p:cNvPr>
+          <p:cNvSpPr>
+            <a:spLocks noGrp="1"/>
+          </p:cNvSpPr>
+          <p:nvPr>
+            <p:ph type="title"/>
+          </p:nvPr>
+        </p:nvSpPr>
+        <p:spPr>
+          <a:xfrm>
+            <a:off x="311700" y="228049"/>
+            <a:ext cx="8520600" cy="572700"/>
+          </a:xfrm>
+        </p:spPr>
+        <p:txBody>
+          <a:bodyPr>
+            <a:normAutofit fontScale="90000"/>
+          </a:bodyPr>
+          <a:lstStyle/>
+          <a:p>
+            <a:r>
+              <a:rPr lang="uk-UA" sz="2800" dirty="0" smtClean="0">
+                <a:solidFill>
+                  <a:schemeClr val="tx1">
+                    <a:lumMod val="65000"/>
+                  </a:schemeClr>
+                </a:solidFill>
+              </a:rPr>
+              <a:t>Типова проблема з маніфестом у зроблених за шаблоном проектах</a:t>
+            </a:r>
+            <a:r>
+              <a:rPr lang="uk-UA" sz="2800" dirty="0">
+                <a:solidFill>
+                  <a:schemeClr val="tx1">
+                    <a:lumMod val="65000"/>
+                  </a:schemeClr>
+                </a:solidFill>
+              </a:rPr>
+              <a:t/>
+            </a:r>
+            <a:br>
+              <a:rPr lang="uk-UA" sz="2800" dirty="0">
+                <a:solidFill>
+                  <a:schemeClr val="tx1">
+                    <a:lumMod val="65000"/>
+                  </a:schemeClr>
+                </a:solidFill>
+              </a:rPr>
+            </a:br>
+            <a:endParaRPr lang="ru-RU" sz="2800" dirty="0">
+              <a:solidFill>
+                <a:schemeClr val="tx1">
+                  <a:lumMod val="65000"/>
+                </a:schemeClr>
+              </a:solidFill>
+            </a:endParaRPr>
+          </a:p>
+        </p:txBody>
+      </p:sp>
+      <p:pic>
+        <p:nvPicPr>
+          <p:cNvPr id="1026" name="Picture 2"/>
+          <p:cNvPicPr>
+            <a:picLocks noChangeAspect="1" noChangeArrowheads="1"/>
+          </p:cNvPicPr>
+          <p:nvPr/>
+        </p:nvPicPr>
+        <p:blipFill>
+          <a:blip r:embed="rId2">
+            <a:extLst>
+              <a:ext uri="{28A0092B-C50C-407E-A947-70E740481C1C}">
+                <a14:useLocalDpi xmlns:a14="http://schemas.microsoft.com/office/drawing/2010/main" val="0"/>
+              </a:ext>
+            </a:extLst>
+          </a:blip>
+          <a:srcRect/>
+          <a:stretch>
+            <a:fillRect/>
+          </a:stretch>
+        </p:blipFill>
+        <p:spPr bwMode="auto">
+          <a:xfrm>
+            <a:off x="3714750" y="1106030"/>
+            <a:ext cx="4975224" cy="2751593"/>
+          </a:xfrm>
+          <a:prstGeom prst="rect">
+            <a:avLst/>
+          </a:prstGeom>
+          <a:noFill/>
+          <a:ln>
+            <a:noFill/>
+          </a:ln>
+          <a:effectLst/>
+          <a:extLst>
+            <a:ext uri="{909E8E84-426E-40DD-AFC4-6F175D3DCCD1}">
+              <a14:hiddenFill xmlns:a14="http://schemas.microsoft.com/office/drawing/2010/main">
+                <a:solidFill>
+                  <a:schemeClr val="accent1"/>
+                </a:solidFill>
+              </a14:hiddenFill>
+            </a:ext>
+            <a:ext uri="{91240B29-F687-4F45-9708-019B960494DF}">
+              <a14:hiddenLine xmlns:a14="http://schemas.microsoft.com/office/drawing/2010/main" w="9525">
+                <a:solidFill>
+                  <a:schemeClr val="tx1"/>
+                </a:solidFill>
+                <a:miter lim="800000"/>
+                <a:headEnd/>
+                <a:tailEnd/>
+              </a14:hiddenLine>
+            </a:ext>
+            <a:ext uri="{AF507438-7753-43E0-B8FC-AC1667EBCBE1}">
+              <a14:hiddenEffects xmlns:a14="http://schemas.microsoft.com/office/drawing/2010/main">
+                <a:effectLst>
+                  <a:outerShdw dist="35921" dir="2700000" algn="ctr" rotWithShape="0">
+                    <a:schemeClr val="bg2"/>
+                  </a:outerShdw>
+                </a:effectLst>
+              </a14:hiddenEffects>
+            </a:ext>
+          </a:extLst>
+        </p:spPr>
+      </p:pic>
+      <p:sp>
+        <p:nvSpPr>
+          <p:cNvPr id="3" name="Прямоугольник 2"/>
+          <p:cNvSpPr/>
+          <p:nvPr/>
+        </p:nvSpPr>
+        <p:spPr>
+          <a:xfrm>
+            <a:off x="333375" y="1175861"/>
+            <a:ext cx="3381375" cy="738664"/>
+          </a:xfrm>
+          <a:prstGeom prst="rect">
+            <a:avLst/>
+          </a:prstGeom>
+        </p:spPr>
+        <p:txBody>
+          <a:bodyPr wrap="square">
+            <a:spAutoFit/>
+          </a:bodyPr>
+          <a:lstStyle/>
+          <a:p>
+            <a:r>
+              <a:rPr lang="en-US" dirty="0">
+                <a:solidFill>
+                  <a:schemeClr val="tx1"/>
+                </a:solidFill>
+              </a:rPr>
+              <a:t>Recommended action: Update this project to use a newer </a:t>
+            </a:r>
+            <a:r>
+              <a:rPr lang="en-US" dirty="0" err="1">
+                <a:solidFill>
+                  <a:schemeClr val="tx1"/>
+                </a:solidFill>
+              </a:rPr>
+              <a:t>compileSdk</a:t>
+            </a:r>
+            <a:endParaRPr lang="en-US" dirty="0">
+              <a:solidFill>
+                <a:schemeClr val="tx1"/>
+              </a:solidFill>
+            </a:endParaRPr>
+          </a:p>
+          <a:p>
+            <a:r>
+              <a:rPr lang="en-US" dirty="0">
+                <a:solidFill>
+                  <a:schemeClr val="tx1"/>
+                </a:solidFill>
+              </a:rPr>
+              <a:t>      of at least 35, for example 35.</a:t>
+            </a:r>
+            <a:endParaRPr lang="ru-RU" dirty="0">
+              <a:solidFill>
+                <a:schemeClr val="tx1"/>
+              </a:solidFill>
+            </a:endParaRPr>
+          </a:p>
+        </p:txBody>
+      </p:sp>
+    </p:spTree>
+    <p:extLst>
+      <p:ext uri="{BB962C8B-B14F-4D97-AF65-F5344CB8AC3E}">
+        <p14:creationId xmlns:p14="http://schemas.microsoft.com/office/powerpoint/2010/main" val="1503284990"/>
+      </p:ext>
+    </p:extLst>
+  </p:cSld>
+  <p:clrMapOvr>
+    <a:masterClrMapping/>
+  </p:clrMapOvr>
+</p:sld>
+</file>
+
+<file path=ppt/slides/slide23.xml><?xml version="1.0" encoding="utf-8"?>
+<p:sld xmlns:a="http://schemas.openxmlformats.org/drawingml/2006/main" xmlns:r="http://schemas.openxmlformats.org/officeDocument/2006/relationships" xmlns:p="http://schemas.openxmlformats.org/presentationml/2006/main">
+  <p:cSld>
+    <p:spTree>
+      <p:nvGrpSpPr>
+        <p:cNvPr id="1" name="">
+          <a:extLst>
+            <a:ext uri="{FF2B5EF4-FFF2-40B4-BE49-F238E27FC236}">
+              <a16:creationId xmlns:a16="http://schemas.microsoft.com/office/drawing/2014/main" xmlns="" id="{C2BCDF65-D003-983C-057A-96B83A5BA50B}"/>
+            </a:ext>
+          </a:extLst>
+        </p:cNvPr>
+        <p:cNvGrpSpPr/>
+        <p:nvPr/>
+      </p:nvGrpSpPr>
+      <p:grpSpPr>
+        <a:xfrm>
+          <a:off x="0" y="0"/>
+          <a:ext cx="0" cy="0"/>
+          <a:chOff x="0" y="0"/>
+          <a:chExt cx="0" cy="0"/>
+        </a:xfrm>
+      </p:grpSpPr>
+      <p:sp>
+        <p:nvSpPr>
+          <p:cNvPr id="2" name="Заголовок 1">
+            <a:extLst>
+              <a:ext uri="{FF2B5EF4-FFF2-40B4-BE49-F238E27FC236}">
+                <a16:creationId xmlns:a16="http://schemas.microsoft.com/office/drawing/2014/main" xmlns="" id="{F7EE2C49-3338-6EA9-6BA0-156C666F049A}"/>
+              </a:ext>
+            </a:extLst>
+          </p:cNvPr>
+          <p:cNvSpPr>
+            <a:spLocks noGrp="1"/>
+          </p:cNvSpPr>
+          <p:nvPr>
+            <p:ph type="title"/>
+          </p:nvPr>
+        </p:nvSpPr>
+        <p:spPr>
+          <a:xfrm>
+            <a:off x="311700" y="228049"/>
+            <a:ext cx="8520600" cy="572700"/>
+          </a:xfrm>
+        </p:spPr>
+        <p:txBody>
+          <a:bodyPr>
+            <a:normAutofit fontScale="90000"/>
+          </a:bodyPr>
+          <a:lstStyle/>
+          <a:p>
+            <a:r>
+              <a:rPr lang="uk-UA" sz="2800" dirty="0" smtClean="0">
+                <a:solidFill>
+                  <a:schemeClr val="tx1">
+                    <a:lumMod val="65000"/>
+                  </a:schemeClr>
+                </a:solidFill>
+              </a:rPr>
+              <a:t>Типова проблема з маніфестом вирішення </a:t>
+            </a:r>
+            <a:r>
+              <a:rPr lang="uk-UA" sz="2800" dirty="0">
+                <a:solidFill>
+                  <a:schemeClr val="tx1">
+                    <a:lumMod val="65000"/>
+                  </a:schemeClr>
+                </a:solidFill>
+              </a:rPr>
+              <a:t/>
+            </a:r>
+            <a:br>
+              <a:rPr lang="uk-UA" sz="2800" dirty="0">
+                <a:solidFill>
+                  <a:schemeClr val="tx1">
+                    <a:lumMod val="65000"/>
+                  </a:schemeClr>
+                </a:solidFill>
+              </a:rPr>
+            </a:br>
+            <a:endParaRPr lang="ru-RU" sz="2800" dirty="0">
+              <a:solidFill>
+                <a:schemeClr val="tx1">
+                  <a:lumMod val="65000"/>
+                </a:schemeClr>
+              </a:solidFill>
+            </a:endParaRPr>
+          </a:p>
+        </p:txBody>
+      </p:sp>
+      <p:sp>
+        <p:nvSpPr>
+          <p:cNvPr id="3" name="Прямоугольник 2"/>
+          <p:cNvSpPr/>
+          <p:nvPr/>
+        </p:nvSpPr>
+        <p:spPr>
+          <a:xfrm>
+            <a:off x="333375" y="1175861"/>
+            <a:ext cx="3381375" cy="738664"/>
+          </a:xfrm>
+          <a:prstGeom prst="rect">
+            <a:avLst/>
+          </a:prstGeom>
+        </p:spPr>
+        <p:txBody>
+          <a:bodyPr wrap="square">
+            <a:spAutoFit/>
+          </a:bodyPr>
+          <a:lstStyle/>
+          <a:p>
+            <a:r>
+              <a:rPr lang="en-US" dirty="0">
+                <a:solidFill>
+                  <a:schemeClr val="tx1"/>
+                </a:solidFill>
+              </a:rPr>
+              <a:t>Recommended action: Update this project to use a newer </a:t>
+            </a:r>
+            <a:r>
+              <a:rPr lang="en-US" dirty="0" err="1">
+                <a:solidFill>
+                  <a:schemeClr val="tx1"/>
+                </a:solidFill>
+              </a:rPr>
+              <a:t>compileSdk</a:t>
+            </a:r>
+            <a:endParaRPr lang="en-US" dirty="0">
+              <a:solidFill>
+                <a:schemeClr val="tx1"/>
+              </a:solidFill>
+            </a:endParaRPr>
+          </a:p>
+          <a:p>
+            <a:r>
+              <a:rPr lang="en-US" dirty="0">
+                <a:solidFill>
+                  <a:schemeClr val="tx1"/>
+                </a:solidFill>
+              </a:rPr>
+              <a:t>      of at least 35, for example 35.</a:t>
+            </a:r>
+            <a:endParaRPr lang="ru-RU" dirty="0">
+              <a:solidFill>
+                <a:schemeClr val="tx1"/>
+              </a:solidFill>
+            </a:endParaRPr>
+          </a:p>
+        </p:txBody>
+      </p:sp>
+      <p:pic>
+        <p:nvPicPr>
+          <p:cNvPr id="2050" name="Picture 2"/>
+          <p:cNvPicPr>
+            <a:picLocks noChangeAspect="1" noChangeArrowheads="1"/>
+          </p:cNvPicPr>
+          <p:nvPr/>
+        </p:nvPicPr>
+        <p:blipFill>
+          <a:blip r:embed="rId2">
+            <a:extLst>
+              <a:ext uri="{28A0092B-C50C-407E-A947-70E740481C1C}">
+                <a14:useLocalDpi xmlns:a14="http://schemas.microsoft.com/office/drawing/2010/main" val="0"/>
+              </a:ext>
+            </a:extLst>
+          </a:blip>
+          <a:srcRect/>
+          <a:stretch>
+            <a:fillRect/>
+          </a:stretch>
+        </p:blipFill>
+        <p:spPr bwMode="auto">
+          <a:xfrm>
+            <a:off x="381000" y="2178815"/>
+            <a:ext cx="6667500" cy="2492721"/>
+          </a:xfrm>
+          <a:prstGeom prst="rect">
+            <a:avLst/>
+          </a:prstGeom>
+          <a:noFill/>
+          <a:ln>
+            <a:noFill/>
+          </a:ln>
+          <a:effectLst/>
+          <a:extLst>
+            <a:ext uri="{909E8E84-426E-40DD-AFC4-6F175D3DCCD1}">
+              <a14:hiddenFill xmlns:a14="http://schemas.microsoft.com/office/drawing/2010/main">
+                <a:solidFill>
+                  <a:schemeClr val="accent1"/>
+                </a:solidFill>
+              </a14:hiddenFill>
+            </a:ext>
+            <a:ext uri="{91240B29-F687-4F45-9708-019B960494DF}">
+              <a14:hiddenLine xmlns:a14="http://schemas.microsoft.com/office/drawing/2010/main" w="9525">
+                <a:solidFill>
+                  <a:schemeClr val="tx1"/>
+                </a:solidFill>
+                <a:miter lim="800000"/>
+                <a:headEnd/>
+                <a:tailEnd/>
+              </a14:hiddenLine>
+            </a:ext>
+            <a:ext uri="{AF507438-7753-43E0-B8FC-AC1667EBCBE1}">
+              <a14:hiddenEffects xmlns:a14="http://schemas.microsoft.com/office/drawing/2010/main">
+                <a:effectLst>
+                  <a:outerShdw dist="35921" dir="2700000" algn="ctr" rotWithShape="0">
+                    <a:schemeClr val="bg2"/>
+                  </a:outerShdw>
+                </a:effectLst>
+              </a14:hiddenEffects>
+            </a:ext>
+          </a:extLst>
+        </p:spPr>
+      </p:pic>
+    </p:spTree>
+    <p:extLst>
+      <p:ext uri="{BB962C8B-B14F-4D97-AF65-F5344CB8AC3E}">
+        <p14:creationId xmlns:p14="http://schemas.microsoft.com/office/powerpoint/2010/main" val="3688890219"/>
+      </p:ext>
+    </p:extLst>
+  </p:cSld>
+  <p:clrMapOvr>
+    <a:masterClrMapping/>
+  </p:clrMapOvr>
+</p:sld>
+</file>
+
+<file path=ppt/slides/slide24.xml><?xml version="1.0" encoding="utf-8"?>
+<p:sld xmlns:a="http://schemas.openxmlformats.org/drawingml/2006/main" xmlns:r="http://schemas.openxmlformats.org/officeDocument/2006/relationships" xmlns:p="http://schemas.openxmlformats.org/presentationml/2006/main">
+  <p:cSld>
+    <p:spTree>
+      <p:nvGrpSpPr>
         <p:cNvPr id="1" name=""/>
         <p:cNvGrpSpPr/>
         <p:nvPr/>
@@ -9739,6 +10209,13 @@
   <p:clrMapOvr>
     <a:masterClrMapping/>
   </p:clrMapOvr>
+  <p:timing>
+    <p:tnLst>
+      <p:par>
+        <p:cTn id="1" dur="indefinite" restart="never" nodeType="tmRoot"/>
+      </p:par>
+    </p:tnLst>
+  </p:timing>
 </p:sld>
 </file>
 

</xml_diff>

<commit_message>
Added 1-2 MMP lectures
</commit_message>
<xml_diff>
--- a/lectures materials/cross platform programming/3. Android studio setup.pptx
+++ b/lectures materials/cross platform programming/3. Android studio setup.pptx
@@ -266,7 +266,7 @@
   </p:defaultTextStyle>
   <p:extLst>
     <p:ext uri="{EFAFB233-063F-42B5-8137-9DF3F51BA10A}">
-      <p15:sldGuideLst xmlns:p15="http://schemas.microsoft.com/office/powerpoint/2012/main" xmlns="">
+      <p15:sldGuideLst xmlns="" xmlns:p15="http://schemas.microsoft.com/office/powerpoint/2012/main">
         <p15:guide id="1" orient="horz" pos="1620">
           <p15:clr>
             <a:srgbClr val="A4A3A4"/>
@@ -5620,7 +5620,7 @@
         <p:cNvPr id="1" name="">
           <a:extLst>
             <a:ext uri="{FF2B5EF4-FFF2-40B4-BE49-F238E27FC236}">
-              <a16:creationId xmlns:a16="http://schemas.microsoft.com/office/drawing/2014/main" xmlns="" id="{2D66DEEC-64F2-1120-090D-CDA212F30665}"/>
+              <a16:creationId xmlns="" xmlns:a16="http://schemas.microsoft.com/office/drawing/2014/main" id="{2D66DEEC-64F2-1120-090D-CDA212F30665}"/>
             </a:ext>
           </a:extLst>
         </p:cNvPr>
@@ -5640,7 +5640,7 @@
           <p:cNvPr id="2" name="Заголовок 1">
             <a:extLst>
               <a:ext uri="{FF2B5EF4-FFF2-40B4-BE49-F238E27FC236}">
-                <a16:creationId xmlns:a16="http://schemas.microsoft.com/office/drawing/2014/main" xmlns="" id="{6702AFB3-86D7-742F-3F1E-DF093C49E6CE}"/>
+                <a16:creationId xmlns="" xmlns:a16="http://schemas.microsoft.com/office/drawing/2014/main" id="{6702AFB3-86D7-742F-3F1E-DF093C49E6CE}"/>
               </a:ext>
             </a:extLst>
           </p:cNvPr>
@@ -5708,7 +5708,7 @@
           <p:cNvPr id="4" name="TextBox 3">
             <a:extLst>
               <a:ext uri="{FF2B5EF4-FFF2-40B4-BE49-F238E27FC236}">
-                <a16:creationId xmlns:a16="http://schemas.microsoft.com/office/drawing/2014/main" xmlns="" id="{363E7E93-AA84-5E7B-AFC5-AFEC40F40EFB}"/>
+                <a16:creationId xmlns="" xmlns:a16="http://schemas.microsoft.com/office/drawing/2014/main" id="{363E7E93-AA84-5E7B-AFC5-AFEC40F40EFB}"/>
               </a:ext>
             </a:extLst>
           </p:cNvPr>
@@ -5795,7 +5795,7 @@
         <p:cNvPr id="1" name="">
           <a:extLst>
             <a:ext uri="{FF2B5EF4-FFF2-40B4-BE49-F238E27FC236}">
-              <a16:creationId xmlns:a16="http://schemas.microsoft.com/office/drawing/2014/main" xmlns="" id="{39FF26B1-F377-F2AD-39EE-9DC0BEE4CD62}"/>
+              <a16:creationId xmlns="" xmlns:a16="http://schemas.microsoft.com/office/drawing/2014/main" id="{39FF26B1-F377-F2AD-39EE-9DC0BEE4CD62}"/>
             </a:ext>
           </a:extLst>
         </p:cNvPr>
@@ -5815,7 +5815,7 @@
           <p:cNvPr id="2" name="Заголовок 1">
             <a:extLst>
               <a:ext uri="{FF2B5EF4-FFF2-40B4-BE49-F238E27FC236}">
-                <a16:creationId xmlns:a16="http://schemas.microsoft.com/office/drawing/2014/main" xmlns="" id="{B6F61629-98DF-E8A7-2C10-769DB07E121B}"/>
+                <a16:creationId xmlns="" xmlns:a16="http://schemas.microsoft.com/office/drawing/2014/main" id="{B6F61629-98DF-E8A7-2C10-769DB07E121B}"/>
               </a:ext>
             </a:extLst>
           </p:cNvPr>
@@ -5883,7 +5883,7 @@
           <p:cNvPr id="4" name="TextBox 3">
             <a:extLst>
               <a:ext uri="{FF2B5EF4-FFF2-40B4-BE49-F238E27FC236}">
-                <a16:creationId xmlns:a16="http://schemas.microsoft.com/office/drawing/2014/main" xmlns="" id="{50F49916-89E6-AE38-A3C1-09ABF7CD8DAD}"/>
+                <a16:creationId xmlns="" xmlns:a16="http://schemas.microsoft.com/office/drawing/2014/main" id="{50F49916-89E6-AE38-A3C1-09ABF7CD8DAD}"/>
               </a:ext>
             </a:extLst>
           </p:cNvPr>
@@ -5970,7 +5970,7 @@
         <p:cNvPr id="1" name="">
           <a:extLst>
             <a:ext uri="{FF2B5EF4-FFF2-40B4-BE49-F238E27FC236}">
-              <a16:creationId xmlns:a16="http://schemas.microsoft.com/office/drawing/2014/main" xmlns="" id="{5429FFC4-6B45-5CEF-5069-BBAD2F6319E4}"/>
+              <a16:creationId xmlns="" xmlns:a16="http://schemas.microsoft.com/office/drawing/2014/main" id="{5429FFC4-6B45-5CEF-5069-BBAD2F6319E4}"/>
             </a:ext>
           </a:extLst>
         </p:cNvPr>
@@ -5990,7 +5990,7 @@
           <p:cNvPr id="2" name="Заголовок 1">
             <a:extLst>
               <a:ext uri="{FF2B5EF4-FFF2-40B4-BE49-F238E27FC236}">
-                <a16:creationId xmlns:a16="http://schemas.microsoft.com/office/drawing/2014/main" xmlns="" id="{F45209AB-82C5-426A-CEC7-0A4AB8E217D9}"/>
+                <a16:creationId xmlns="" xmlns:a16="http://schemas.microsoft.com/office/drawing/2014/main" id="{F45209AB-82C5-426A-CEC7-0A4AB8E217D9}"/>
               </a:ext>
             </a:extLst>
           </p:cNvPr>
@@ -6058,7 +6058,7 @@
           <p:cNvPr id="4" name="TextBox 3">
             <a:extLst>
               <a:ext uri="{FF2B5EF4-FFF2-40B4-BE49-F238E27FC236}">
-                <a16:creationId xmlns:a16="http://schemas.microsoft.com/office/drawing/2014/main" xmlns="" id="{62C3FB9A-62C0-D061-69AD-B6D2DF9395E6}"/>
+                <a16:creationId xmlns="" xmlns:a16="http://schemas.microsoft.com/office/drawing/2014/main" id="{62C3FB9A-62C0-D061-69AD-B6D2DF9395E6}"/>
               </a:ext>
             </a:extLst>
           </p:cNvPr>
@@ -6157,7 +6157,7 @@
         <p:cNvPr id="1" name="">
           <a:extLst>
             <a:ext uri="{FF2B5EF4-FFF2-40B4-BE49-F238E27FC236}">
-              <a16:creationId xmlns:a16="http://schemas.microsoft.com/office/drawing/2014/main" xmlns="" id="{7FD98849-7240-1A6E-A2CD-348146E80A94}"/>
+              <a16:creationId xmlns="" xmlns:a16="http://schemas.microsoft.com/office/drawing/2014/main" id="{7FD98849-7240-1A6E-A2CD-348146E80A94}"/>
             </a:ext>
           </a:extLst>
         </p:cNvPr>
@@ -6177,7 +6177,7 @@
           <p:cNvPr id="2" name="Заголовок 1">
             <a:extLst>
               <a:ext uri="{FF2B5EF4-FFF2-40B4-BE49-F238E27FC236}">
-                <a16:creationId xmlns:a16="http://schemas.microsoft.com/office/drawing/2014/main" xmlns="" id="{3D4FF6D3-1908-9F1E-6819-251B3BC2812F}"/>
+                <a16:creationId xmlns="" xmlns:a16="http://schemas.microsoft.com/office/drawing/2014/main" id="{3D4FF6D3-1908-9F1E-6819-251B3BC2812F}"/>
               </a:ext>
             </a:extLst>
           </p:cNvPr>
@@ -6225,7 +6225,7 @@
           <p:cNvPr id="4" name="TextBox 3">
             <a:extLst>
               <a:ext uri="{FF2B5EF4-FFF2-40B4-BE49-F238E27FC236}">
-                <a16:creationId xmlns:a16="http://schemas.microsoft.com/office/drawing/2014/main" xmlns="" id="{9989F27A-1D24-A0B2-4EA3-711BFA30F371}"/>
+                <a16:creationId xmlns="" xmlns:a16="http://schemas.microsoft.com/office/drawing/2014/main" id="{9989F27A-1D24-A0B2-4EA3-711BFA30F371}"/>
               </a:ext>
             </a:extLst>
           </p:cNvPr>
@@ -6400,7 +6400,7 @@
           <p:cNvPr id="5" name="Рисунок 4">
             <a:extLst>
               <a:ext uri="{FF2B5EF4-FFF2-40B4-BE49-F238E27FC236}">
-                <a16:creationId xmlns:a16="http://schemas.microsoft.com/office/drawing/2014/main" xmlns="" id="{1939FD42-7D30-1D03-9BDA-92B1473BCE1D}"/>
+                <a16:creationId xmlns="" xmlns:a16="http://schemas.microsoft.com/office/drawing/2014/main" id="{1939FD42-7D30-1D03-9BDA-92B1473BCE1D}"/>
               </a:ext>
             </a:extLst>
           </p:cNvPr>
@@ -6446,7 +6446,7 @@
         <p:cNvPr id="1" name="">
           <a:extLst>
             <a:ext uri="{FF2B5EF4-FFF2-40B4-BE49-F238E27FC236}">
-              <a16:creationId xmlns:a16="http://schemas.microsoft.com/office/drawing/2014/main" xmlns="" id="{312DACCE-5B7D-0CD1-BD9D-FEE891C22A91}"/>
+              <a16:creationId xmlns="" xmlns:a16="http://schemas.microsoft.com/office/drawing/2014/main" id="{312DACCE-5B7D-0CD1-BD9D-FEE891C22A91}"/>
             </a:ext>
           </a:extLst>
         </p:cNvPr>
@@ -6466,7 +6466,7 @@
           <p:cNvPr id="2" name="Заголовок 1">
             <a:extLst>
               <a:ext uri="{FF2B5EF4-FFF2-40B4-BE49-F238E27FC236}">
-                <a16:creationId xmlns:a16="http://schemas.microsoft.com/office/drawing/2014/main" xmlns="" id="{549802A0-0651-7FC0-F4C0-A963720538D5}"/>
+                <a16:creationId xmlns="" xmlns:a16="http://schemas.microsoft.com/office/drawing/2014/main" id="{549802A0-0651-7FC0-F4C0-A963720538D5}"/>
               </a:ext>
             </a:extLst>
           </p:cNvPr>
@@ -6514,7 +6514,7 @@
           <p:cNvPr id="4" name="TextBox 3">
             <a:extLst>
               <a:ext uri="{FF2B5EF4-FFF2-40B4-BE49-F238E27FC236}">
-                <a16:creationId xmlns:a16="http://schemas.microsoft.com/office/drawing/2014/main" xmlns="" id="{B9AB8958-33E6-C86D-990A-DD5D518134F5}"/>
+                <a16:creationId xmlns="" xmlns:a16="http://schemas.microsoft.com/office/drawing/2014/main" id="{B9AB8958-33E6-C86D-990A-DD5D518134F5}"/>
               </a:ext>
             </a:extLst>
           </p:cNvPr>
@@ -6625,7 +6625,7 @@
           <p:cNvPr id="7" name="Изображение 4">
             <a:extLst>
               <a:ext uri="{FF2B5EF4-FFF2-40B4-BE49-F238E27FC236}">
-                <a16:creationId xmlns:a16="http://schemas.microsoft.com/office/drawing/2014/main" xmlns="" id="{A8D0FA2D-BB5A-4F73-B8F1-23FA474E1D31}"/>
+                <a16:creationId xmlns="" xmlns:a16="http://schemas.microsoft.com/office/drawing/2014/main" id="{A8D0FA2D-BB5A-4F73-B8F1-23FA474E1D31}"/>
               </a:ext>
             </a:extLst>
           </p:cNvPr>
@@ -6671,7 +6671,7 @@
         <p:cNvPr id="1" name="">
           <a:extLst>
             <a:ext uri="{FF2B5EF4-FFF2-40B4-BE49-F238E27FC236}">
-              <a16:creationId xmlns:a16="http://schemas.microsoft.com/office/drawing/2014/main" xmlns="" id="{78BBF53B-7CCC-A967-5B5E-C478511F5550}"/>
+              <a16:creationId xmlns="" xmlns:a16="http://schemas.microsoft.com/office/drawing/2014/main" id="{78BBF53B-7CCC-A967-5B5E-C478511F5550}"/>
             </a:ext>
           </a:extLst>
         </p:cNvPr>
@@ -6691,7 +6691,7 @@
           <p:cNvPr id="2" name="Заголовок 1">
             <a:extLst>
               <a:ext uri="{FF2B5EF4-FFF2-40B4-BE49-F238E27FC236}">
-                <a16:creationId xmlns:a16="http://schemas.microsoft.com/office/drawing/2014/main" xmlns="" id="{DD2DD4B7-7356-E236-DAE1-6E38EF421C55}"/>
+                <a16:creationId xmlns="" xmlns:a16="http://schemas.microsoft.com/office/drawing/2014/main" id="{DD2DD4B7-7356-E236-DAE1-6E38EF421C55}"/>
               </a:ext>
             </a:extLst>
           </p:cNvPr>
@@ -6739,7 +6739,7 @@
           <p:cNvPr id="4" name="TextBox 3">
             <a:extLst>
               <a:ext uri="{FF2B5EF4-FFF2-40B4-BE49-F238E27FC236}">
-                <a16:creationId xmlns:a16="http://schemas.microsoft.com/office/drawing/2014/main" xmlns="" id="{DCDCEDFE-1681-4CC2-A5D5-464732AD19B1}"/>
+                <a16:creationId xmlns="" xmlns:a16="http://schemas.microsoft.com/office/drawing/2014/main" id="{DCDCEDFE-1681-4CC2-A5D5-464732AD19B1}"/>
               </a:ext>
             </a:extLst>
           </p:cNvPr>
@@ -6858,7 +6858,7 @@
           <p:cNvPr id="10" name="Рисунок 9">
             <a:extLst>
               <a:ext uri="{FF2B5EF4-FFF2-40B4-BE49-F238E27FC236}">
-                <a16:creationId xmlns:a16="http://schemas.microsoft.com/office/drawing/2014/main" xmlns="" id="{B11744FE-DCBA-EBFD-0854-D596739403A9}"/>
+                <a16:creationId xmlns="" xmlns:a16="http://schemas.microsoft.com/office/drawing/2014/main" id="{B11744FE-DCBA-EBFD-0854-D596739403A9}"/>
               </a:ext>
             </a:extLst>
           </p:cNvPr>
@@ -6904,7 +6904,7 @@
         <p:cNvPr id="1" name="">
           <a:extLst>
             <a:ext uri="{FF2B5EF4-FFF2-40B4-BE49-F238E27FC236}">
-              <a16:creationId xmlns:a16="http://schemas.microsoft.com/office/drawing/2014/main" xmlns="" id="{234A7B5D-BB37-D65A-D67E-D1A4A0E6027F}"/>
+              <a16:creationId xmlns="" xmlns:a16="http://schemas.microsoft.com/office/drawing/2014/main" id="{234A7B5D-BB37-D65A-D67E-D1A4A0E6027F}"/>
             </a:ext>
           </a:extLst>
         </p:cNvPr>
@@ -6924,7 +6924,7 @@
           <p:cNvPr id="2" name="Заголовок 1">
             <a:extLst>
               <a:ext uri="{FF2B5EF4-FFF2-40B4-BE49-F238E27FC236}">
-                <a16:creationId xmlns:a16="http://schemas.microsoft.com/office/drawing/2014/main" xmlns="" id="{A498CF86-B068-58DF-2D5B-E8872E9300AD}"/>
+                <a16:creationId xmlns="" xmlns:a16="http://schemas.microsoft.com/office/drawing/2014/main" id="{A498CF86-B068-58DF-2D5B-E8872E9300AD}"/>
               </a:ext>
             </a:extLst>
           </p:cNvPr>
@@ -6972,7 +6972,7 @@
           <p:cNvPr id="7" name="TextBox 6">
             <a:extLst>
               <a:ext uri="{FF2B5EF4-FFF2-40B4-BE49-F238E27FC236}">
-                <a16:creationId xmlns:a16="http://schemas.microsoft.com/office/drawing/2014/main" xmlns="" id="{E6ACDF50-0E6A-8E0E-1E7E-7F6330CBCACA}"/>
+                <a16:creationId xmlns="" xmlns:a16="http://schemas.microsoft.com/office/drawing/2014/main" id="{E6ACDF50-0E6A-8E0E-1E7E-7F6330CBCACA}"/>
               </a:ext>
             </a:extLst>
           </p:cNvPr>
@@ -7306,7 +7306,7 @@
         <p:cNvPr id="1" name="">
           <a:extLst>
             <a:ext uri="{FF2B5EF4-FFF2-40B4-BE49-F238E27FC236}">
-              <a16:creationId xmlns:a16="http://schemas.microsoft.com/office/drawing/2014/main" xmlns="" id="{4C883855-FC19-5E12-10BE-81CE2ADA218A}"/>
+              <a16:creationId xmlns="" xmlns:a16="http://schemas.microsoft.com/office/drawing/2014/main" id="{4C883855-FC19-5E12-10BE-81CE2ADA218A}"/>
             </a:ext>
           </a:extLst>
         </p:cNvPr>
@@ -7326,7 +7326,7 @@
           <p:cNvPr id="2" name="Заголовок 1">
             <a:extLst>
               <a:ext uri="{FF2B5EF4-FFF2-40B4-BE49-F238E27FC236}">
-                <a16:creationId xmlns:a16="http://schemas.microsoft.com/office/drawing/2014/main" xmlns="" id="{2E73A312-419B-838A-38E5-F10329967E6F}"/>
+                <a16:creationId xmlns="" xmlns:a16="http://schemas.microsoft.com/office/drawing/2014/main" id="{2E73A312-419B-838A-38E5-F10329967E6F}"/>
               </a:ext>
             </a:extLst>
           </p:cNvPr>
@@ -7374,7 +7374,7 @@
           <p:cNvPr id="7" name="TextBox 6">
             <a:extLst>
               <a:ext uri="{FF2B5EF4-FFF2-40B4-BE49-F238E27FC236}">
-                <a16:creationId xmlns:a16="http://schemas.microsoft.com/office/drawing/2014/main" xmlns="" id="{F6B9F6AC-08C0-D98B-7D62-DA8AF500DA18}"/>
+                <a16:creationId xmlns="" xmlns:a16="http://schemas.microsoft.com/office/drawing/2014/main" id="{F6B9F6AC-08C0-D98B-7D62-DA8AF500DA18}"/>
               </a:ext>
             </a:extLst>
           </p:cNvPr>
@@ -7523,7 +7523,7 @@
           <p:cNvPr id="4" name="Рисунок 3">
             <a:extLst>
               <a:ext uri="{FF2B5EF4-FFF2-40B4-BE49-F238E27FC236}">
-                <a16:creationId xmlns:a16="http://schemas.microsoft.com/office/drawing/2014/main" xmlns="" id="{66EE2D6A-728F-0F2A-1C37-DDB28251AF68}"/>
+                <a16:creationId xmlns="" xmlns:a16="http://schemas.microsoft.com/office/drawing/2014/main" id="{66EE2D6A-728F-0F2A-1C37-DDB28251AF68}"/>
               </a:ext>
             </a:extLst>
           </p:cNvPr>
@@ -7569,7 +7569,7 @@
         <p:cNvPr id="1" name="">
           <a:extLst>
             <a:ext uri="{FF2B5EF4-FFF2-40B4-BE49-F238E27FC236}">
-              <a16:creationId xmlns:a16="http://schemas.microsoft.com/office/drawing/2014/main" xmlns="" id="{0D9AC260-E8FB-6880-5069-264E0927C272}"/>
+              <a16:creationId xmlns="" xmlns:a16="http://schemas.microsoft.com/office/drawing/2014/main" id="{0D9AC260-E8FB-6880-5069-264E0927C272}"/>
             </a:ext>
           </a:extLst>
         </p:cNvPr>
@@ -7589,7 +7589,7 @@
           <p:cNvPr id="2" name="Заголовок 1">
             <a:extLst>
               <a:ext uri="{FF2B5EF4-FFF2-40B4-BE49-F238E27FC236}">
-                <a16:creationId xmlns:a16="http://schemas.microsoft.com/office/drawing/2014/main" xmlns="" id="{09213786-DF7B-F555-56F3-3B918504C38C}"/>
+                <a16:creationId xmlns="" xmlns:a16="http://schemas.microsoft.com/office/drawing/2014/main" id="{09213786-DF7B-F555-56F3-3B918504C38C}"/>
               </a:ext>
             </a:extLst>
           </p:cNvPr>
@@ -7637,7 +7637,7 @@
           <p:cNvPr id="5" name="Рисунок 4">
             <a:extLst>
               <a:ext uri="{FF2B5EF4-FFF2-40B4-BE49-F238E27FC236}">
-                <a16:creationId xmlns:a16="http://schemas.microsoft.com/office/drawing/2014/main" xmlns="" id="{BBA72352-4A6D-651C-F948-97E874377792}"/>
+                <a16:creationId xmlns="" xmlns:a16="http://schemas.microsoft.com/office/drawing/2014/main" id="{BBA72352-4A6D-651C-F948-97E874377792}"/>
               </a:ext>
             </a:extLst>
           </p:cNvPr>
@@ -7683,7 +7683,7 @@
         <p:cNvPr id="1" name="">
           <a:extLst>
             <a:ext uri="{FF2B5EF4-FFF2-40B4-BE49-F238E27FC236}">
-              <a16:creationId xmlns:a16="http://schemas.microsoft.com/office/drawing/2014/main" xmlns="" id="{BD8DE2F5-0BE3-2B22-D8E2-F5D256666195}"/>
+              <a16:creationId xmlns="" xmlns:a16="http://schemas.microsoft.com/office/drawing/2014/main" id="{BD8DE2F5-0BE3-2B22-D8E2-F5D256666195}"/>
             </a:ext>
           </a:extLst>
         </p:cNvPr>
@@ -7703,7 +7703,7 @@
           <p:cNvPr id="2" name="Заголовок 1">
             <a:extLst>
               <a:ext uri="{FF2B5EF4-FFF2-40B4-BE49-F238E27FC236}">
-                <a16:creationId xmlns:a16="http://schemas.microsoft.com/office/drawing/2014/main" xmlns="" id="{0ACA792D-D6DA-DF21-B130-29D8FCBD9DEF}"/>
+                <a16:creationId xmlns="" xmlns:a16="http://schemas.microsoft.com/office/drawing/2014/main" id="{0ACA792D-D6DA-DF21-B130-29D8FCBD9DEF}"/>
               </a:ext>
             </a:extLst>
           </p:cNvPr>
@@ -7760,7 +7760,7 @@
           <p:cNvPr id="4" name="TextBox 3">
             <a:extLst>
               <a:ext uri="{FF2B5EF4-FFF2-40B4-BE49-F238E27FC236}">
-                <a16:creationId xmlns:a16="http://schemas.microsoft.com/office/drawing/2014/main" xmlns="" id="{B03021CA-8F1F-ABAC-A179-885D2120A7E5}"/>
+                <a16:creationId xmlns="" xmlns:a16="http://schemas.microsoft.com/office/drawing/2014/main" id="{B03021CA-8F1F-ABAC-A179-885D2120A7E5}"/>
               </a:ext>
             </a:extLst>
           </p:cNvPr>
@@ -7871,7 +7871,7 @@
           <p:cNvPr id="21" name="Рисунок 20">
             <a:extLst>
               <a:ext uri="{FF2B5EF4-FFF2-40B4-BE49-F238E27FC236}">
-                <a16:creationId xmlns:a16="http://schemas.microsoft.com/office/drawing/2014/main" xmlns="" id="{38DC4D2E-2C8D-BB5E-B89E-CF17D671B261}"/>
+                <a16:creationId xmlns="" xmlns:a16="http://schemas.microsoft.com/office/drawing/2014/main" id="{38DC4D2E-2C8D-BB5E-B89E-CF17D671B261}"/>
               </a:ext>
             </a:extLst>
           </p:cNvPr>
@@ -8084,7 +8084,7 @@
         <p:cNvPr id="1" name="">
           <a:extLst>
             <a:ext uri="{FF2B5EF4-FFF2-40B4-BE49-F238E27FC236}">
-              <a16:creationId xmlns:a16="http://schemas.microsoft.com/office/drawing/2014/main" xmlns="" id="{B2EAA657-17BA-C92C-611D-E81227759765}"/>
+              <a16:creationId xmlns="" xmlns:a16="http://schemas.microsoft.com/office/drawing/2014/main" id="{B2EAA657-17BA-C92C-611D-E81227759765}"/>
             </a:ext>
           </a:extLst>
         </p:cNvPr>
@@ -8104,7 +8104,7 @@
           <p:cNvPr id="13" name="TextBox 12">
             <a:extLst>
               <a:ext uri="{FF2B5EF4-FFF2-40B4-BE49-F238E27FC236}">
-                <a16:creationId xmlns:a16="http://schemas.microsoft.com/office/drawing/2014/main" xmlns="" id="{E7A8CFEF-7AA8-12DC-2F6E-9F575191CBB2}"/>
+                <a16:creationId xmlns="" xmlns:a16="http://schemas.microsoft.com/office/drawing/2014/main" id="{E7A8CFEF-7AA8-12DC-2F6E-9F575191CBB2}"/>
               </a:ext>
             </a:extLst>
           </p:cNvPr>
@@ -8329,7 +8329,7 @@
           <p:cNvPr id="2" name="Заголовок 1">
             <a:extLst>
               <a:ext uri="{FF2B5EF4-FFF2-40B4-BE49-F238E27FC236}">
-                <a16:creationId xmlns:a16="http://schemas.microsoft.com/office/drawing/2014/main" xmlns="" id="{7B411182-3BA6-201C-D833-263C8F971A2E}"/>
+                <a16:creationId xmlns="" xmlns:a16="http://schemas.microsoft.com/office/drawing/2014/main" id="{7B411182-3BA6-201C-D833-263C8F971A2E}"/>
               </a:ext>
             </a:extLst>
           </p:cNvPr>
@@ -8386,7 +8386,7 @@
           <p:cNvPr id="11" name="TextBox 10">
             <a:extLst>
               <a:ext uri="{FF2B5EF4-FFF2-40B4-BE49-F238E27FC236}">
-                <a16:creationId xmlns:a16="http://schemas.microsoft.com/office/drawing/2014/main" xmlns="" id="{E98D7C92-A408-35C4-F90B-6CC9ECD4AB4C}"/>
+                <a16:creationId xmlns="" xmlns:a16="http://schemas.microsoft.com/office/drawing/2014/main" id="{E98D7C92-A408-35C4-F90B-6CC9ECD4AB4C}"/>
               </a:ext>
             </a:extLst>
           </p:cNvPr>
@@ -8503,7 +8503,7 @@
           <p:cNvPr id="15" name="TextBox 14">
             <a:extLst>
               <a:ext uri="{FF2B5EF4-FFF2-40B4-BE49-F238E27FC236}">
-                <a16:creationId xmlns:a16="http://schemas.microsoft.com/office/drawing/2014/main" xmlns="" id="{659B1991-F87A-C002-89C5-2873C3292A5F}"/>
+                <a16:creationId xmlns="" xmlns:a16="http://schemas.microsoft.com/office/drawing/2014/main" id="{659B1991-F87A-C002-89C5-2873C3292A5F}"/>
               </a:ext>
             </a:extLst>
           </p:cNvPr>
@@ -8754,7 +8754,7 @@
           <p:cNvPr id="7" name="Рисунок 6">
             <a:extLst>
               <a:ext uri="{FF2B5EF4-FFF2-40B4-BE49-F238E27FC236}">
-                <a16:creationId xmlns:a16="http://schemas.microsoft.com/office/drawing/2014/main" xmlns="" id="{0641F7C1-223E-BB5A-CC64-2B212EC1198A}"/>
+                <a16:creationId xmlns="" xmlns:a16="http://schemas.microsoft.com/office/drawing/2014/main" id="{0641F7C1-223E-BB5A-CC64-2B212EC1198A}"/>
               </a:ext>
             </a:extLst>
           </p:cNvPr>
@@ -8784,7 +8784,7 @@
           <p:cNvPr id="24" name="Групувати 23">
             <a:extLst>
               <a:ext uri="{FF2B5EF4-FFF2-40B4-BE49-F238E27FC236}">
-                <a16:creationId xmlns:a16="http://schemas.microsoft.com/office/drawing/2014/main" xmlns="" id="{AD86BC18-EC97-9968-5D5A-400DA4FBB10D}"/>
+                <a16:creationId xmlns="" xmlns:a16="http://schemas.microsoft.com/office/drawing/2014/main" id="{AD86BC18-EC97-9968-5D5A-400DA4FBB10D}"/>
               </a:ext>
             </a:extLst>
           </p:cNvPr>
@@ -8804,7 +8804,7 @@
             <p:cNvPr id="22" name="Рисунок 21">
               <a:extLst>
                 <a:ext uri="{FF2B5EF4-FFF2-40B4-BE49-F238E27FC236}">
-                  <a16:creationId xmlns:a16="http://schemas.microsoft.com/office/drawing/2014/main" xmlns="" id="{058FDF12-84A7-E7E5-6717-687AC8BFE6F6}"/>
+                  <a16:creationId xmlns="" xmlns:a16="http://schemas.microsoft.com/office/drawing/2014/main" id="{058FDF12-84A7-E7E5-6717-687AC8BFE6F6}"/>
                 </a:ext>
               </a:extLst>
             </p:cNvPr>
@@ -8834,7 +8834,7 @@
             <p:cNvPr id="23" name="Прямокутник 22">
               <a:extLst>
                 <a:ext uri="{FF2B5EF4-FFF2-40B4-BE49-F238E27FC236}">
-                  <a16:creationId xmlns:a16="http://schemas.microsoft.com/office/drawing/2014/main" xmlns="" id="{BC85BF5D-D921-41C0-185A-D5F6F19CF1DF}"/>
+                  <a16:creationId xmlns="" xmlns:a16="http://schemas.microsoft.com/office/drawing/2014/main" id="{BC85BF5D-D921-41C0-185A-D5F6F19CF1DF}"/>
                 </a:ext>
               </a:extLst>
             </p:cNvPr>
@@ -8887,7 +8887,7 @@
           <p:cNvPr id="26" name="Групувати 25">
             <a:extLst>
               <a:ext uri="{FF2B5EF4-FFF2-40B4-BE49-F238E27FC236}">
-                <a16:creationId xmlns:a16="http://schemas.microsoft.com/office/drawing/2014/main" xmlns="" id="{75E61B85-AB26-C0B4-03DF-7D6FA6FFC08E}"/>
+                <a16:creationId xmlns="" xmlns:a16="http://schemas.microsoft.com/office/drawing/2014/main" id="{75E61B85-AB26-C0B4-03DF-7D6FA6FFC08E}"/>
               </a:ext>
             </a:extLst>
           </p:cNvPr>
@@ -8907,7 +8907,7 @@
             <p:cNvPr id="17" name="Рисунок 16">
               <a:extLst>
                 <a:ext uri="{FF2B5EF4-FFF2-40B4-BE49-F238E27FC236}">
-                  <a16:creationId xmlns:a16="http://schemas.microsoft.com/office/drawing/2014/main" xmlns="" id="{669314E6-05A8-22FE-EEC1-8CE48E796FED}"/>
+                  <a16:creationId xmlns="" xmlns:a16="http://schemas.microsoft.com/office/drawing/2014/main" id="{669314E6-05A8-22FE-EEC1-8CE48E796FED}"/>
                 </a:ext>
               </a:extLst>
             </p:cNvPr>
@@ -8937,7 +8937,7 @@
             <p:cNvPr id="25" name="Прямокутник 24">
               <a:extLst>
                 <a:ext uri="{FF2B5EF4-FFF2-40B4-BE49-F238E27FC236}">
-                  <a16:creationId xmlns:a16="http://schemas.microsoft.com/office/drawing/2014/main" xmlns="" id="{E1E97DA0-0DD2-CC72-5760-F9D28F49DA87}"/>
+                  <a16:creationId xmlns="" xmlns:a16="http://schemas.microsoft.com/office/drawing/2014/main" id="{E1E97DA0-0DD2-CC72-5760-F9D28F49DA87}"/>
                 </a:ext>
               </a:extLst>
             </p:cNvPr>
@@ -9006,7 +9006,7 @@
         <p:cNvPr id="1" name="">
           <a:extLst>
             <a:ext uri="{FF2B5EF4-FFF2-40B4-BE49-F238E27FC236}">
-              <a16:creationId xmlns:a16="http://schemas.microsoft.com/office/drawing/2014/main" xmlns="" id="{C2BCDF65-D003-983C-057A-96B83A5BA50B}"/>
+              <a16:creationId xmlns="" xmlns:a16="http://schemas.microsoft.com/office/drawing/2014/main" id="{C2BCDF65-D003-983C-057A-96B83A5BA50B}"/>
             </a:ext>
           </a:extLst>
         </p:cNvPr>
@@ -9026,7 +9026,7 @@
           <p:cNvPr id="13" name="TextBox 12">
             <a:extLst>
               <a:ext uri="{FF2B5EF4-FFF2-40B4-BE49-F238E27FC236}">
-                <a16:creationId xmlns:a16="http://schemas.microsoft.com/office/drawing/2014/main" xmlns="" id="{89CE9685-7985-62C5-4DD4-420DA17C8A74}"/>
+                <a16:creationId xmlns="" xmlns:a16="http://schemas.microsoft.com/office/drawing/2014/main" id="{89CE9685-7985-62C5-4DD4-420DA17C8A74}"/>
               </a:ext>
             </a:extLst>
           </p:cNvPr>
@@ -9435,7 +9435,7 @@
           <p:cNvPr id="2" name="Заголовок 1">
             <a:extLst>
               <a:ext uri="{FF2B5EF4-FFF2-40B4-BE49-F238E27FC236}">
-                <a16:creationId xmlns:a16="http://schemas.microsoft.com/office/drawing/2014/main" xmlns="" id="{F7EE2C49-3338-6EA9-6BA0-156C666F049A}"/>
+                <a16:creationId xmlns="" xmlns:a16="http://schemas.microsoft.com/office/drawing/2014/main" id="{F7EE2C49-3338-6EA9-6BA0-156C666F049A}"/>
               </a:ext>
             </a:extLst>
           </p:cNvPr>
@@ -9492,7 +9492,7 @@
           <p:cNvPr id="4" name="Рисунок 3">
             <a:extLst>
               <a:ext uri="{FF2B5EF4-FFF2-40B4-BE49-F238E27FC236}">
-                <a16:creationId xmlns:a16="http://schemas.microsoft.com/office/drawing/2014/main" xmlns="" id="{03D8E5A2-2E6E-F257-AE0E-924D868970F6}"/>
+                <a16:creationId xmlns="" xmlns:a16="http://schemas.microsoft.com/office/drawing/2014/main" id="{03D8E5A2-2E6E-F257-AE0E-924D868970F6}"/>
               </a:ext>
             </a:extLst>
           </p:cNvPr>
@@ -9538,7 +9538,7 @@
         <p:cNvPr id="1" name="">
           <a:extLst>
             <a:ext uri="{FF2B5EF4-FFF2-40B4-BE49-F238E27FC236}">
-              <a16:creationId xmlns:a16="http://schemas.microsoft.com/office/drawing/2014/main" xmlns="" id="{C2BCDF65-D003-983C-057A-96B83A5BA50B}"/>
+              <a16:creationId xmlns="" xmlns:a16="http://schemas.microsoft.com/office/drawing/2014/main" id="{C2BCDF65-D003-983C-057A-96B83A5BA50B}"/>
             </a:ext>
           </a:extLst>
         </p:cNvPr>
@@ -9558,7 +9558,7 @@
           <p:cNvPr id="2" name="Заголовок 1">
             <a:extLst>
               <a:ext uri="{FF2B5EF4-FFF2-40B4-BE49-F238E27FC236}">
-                <a16:creationId xmlns:a16="http://schemas.microsoft.com/office/drawing/2014/main" xmlns="" id="{F7EE2C49-3338-6EA9-6BA0-156C666F049A}"/>
+                <a16:creationId xmlns="" xmlns:a16="http://schemas.microsoft.com/office/drawing/2014/main" id="{F7EE2C49-3338-6EA9-6BA0-156C666F049A}"/>
               </a:ext>
             </a:extLst>
           </p:cNvPr>
@@ -9765,7 +9765,7 @@
         <p:cNvPr id="1" name="">
           <a:extLst>
             <a:ext uri="{FF2B5EF4-FFF2-40B4-BE49-F238E27FC236}">
-              <a16:creationId xmlns:a16="http://schemas.microsoft.com/office/drawing/2014/main" xmlns="" id="{C2BCDF65-D003-983C-057A-96B83A5BA50B}"/>
+              <a16:creationId xmlns="" xmlns:a16="http://schemas.microsoft.com/office/drawing/2014/main" id="{C2BCDF65-D003-983C-057A-96B83A5BA50B}"/>
             </a:ext>
           </a:extLst>
         </p:cNvPr>
@@ -9785,7 +9785,7 @@
           <p:cNvPr id="2" name="Заголовок 1">
             <a:extLst>
               <a:ext uri="{FF2B5EF4-FFF2-40B4-BE49-F238E27FC236}">
-                <a16:creationId xmlns:a16="http://schemas.microsoft.com/office/drawing/2014/main" xmlns="" id="{F7EE2C49-3338-6EA9-6BA0-156C666F049A}"/>
+                <a16:creationId xmlns="" xmlns:a16="http://schemas.microsoft.com/office/drawing/2014/main" id="{F7EE2C49-3338-6EA9-6BA0-156C666F049A}"/>
               </a:ext>
             </a:extLst>
           </p:cNvPr>
@@ -9909,7 +9909,7 @@
       </p:sp>
       <p:pic>
         <p:nvPicPr>
-          <p:cNvPr id="2050" name="Picture 2"/>
+          <p:cNvPr id="1026" name="Picture 2"/>
           <p:cNvPicPr>
             <a:picLocks noChangeAspect="1" noChangeArrowheads="1"/>
           </p:cNvPicPr>
@@ -9930,8 +9930,72 @@
         </p:blipFill>
         <p:spPr bwMode="auto">
           <a:xfrm>
-            <a:off x="381000" y="2178815"/>
-            <a:ext cx="6667500" cy="2492721"/>
+            <a:off x="3590925" y="1175861"/>
+            <a:ext cx="3827463" cy="959788"/>
+          </a:xfrm>
+          <a:prstGeom prst="rect">
+            <a:avLst/>
+          </a:prstGeom>
+          <a:noFill/>
+          <a:ln>
+            <a:noFill/>
+          </a:ln>
+          <a:effectLst/>
+          <a:extLst>
+            <a:ext uri="{909E8E84-426E-40DD-AFC4-6F175D3DCCD1}">
+              <a14:hiddenFill xmlns:a14="http://schemas.microsoft.com/office/drawing/2010/main">
+                <a:solidFill>
+                  <a:schemeClr val="accent1"/>
+                </a:solidFill>
+              </a14:hiddenFill>
+            </a:ext>
+            <a:ext uri="{91240B29-F687-4F45-9708-019B960494DF}">
+              <a14:hiddenLine xmlns:a14="http://schemas.microsoft.com/office/drawing/2010/main" w="9525">
+                <a:solidFill>
+                  <a:schemeClr val="tx1"/>
+                </a:solidFill>
+                <a:miter lim="800000"/>
+                <a:headEnd/>
+                <a:tailEnd/>
+              </a14:hiddenLine>
+            </a:ext>
+            <a:ext uri="{AF507438-7753-43E0-B8FC-AC1667EBCBE1}">
+              <a14:hiddenEffects xmlns:a14="http://schemas.microsoft.com/office/drawing/2010/main">
+                <a:effectLst>
+                  <a:outerShdw dist="35921" dir="2700000" algn="ctr" rotWithShape="0">
+                    <a:schemeClr val="bg2"/>
+                  </a:outerShdw>
+                </a:effectLst>
+              </a14:hiddenEffects>
+            </a:ext>
+          </a:extLst>
+        </p:spPr>
+      </p:pic>
+      <p:pic>
+        <p:nvPicPr>
+          <p:cNvPr id="1027" name="Picture 3"/>
+          <p:cNvPicPr>
+            <a:picLocks noChangeAspect="1" noChangeArrowheads="1"/>
+          </p:cNvPicPr>
+          <p:nvPr/>
+        </p:nvPicPr>
+        <p:blipFill>
+          <a:blip r:embed="rId3">
+            <a:extLst>
+              <a:ext uri="{28A0092B-C50C-407E-A947-70E740481C1C}">
+                <a14:useLocalDpi xmlns:a14="http://schemas.microsoft.com/office/drawing/2010/main" val="0"/>
+              </a:ext>
+            </a:extLst>
+          </a:blip>
+          <a:srcRect/>
+          <a:stretch>
+            <a:fillRect/>
+          </a:stretch>
+        </p:blipFill>
+        <p:spPr bwMode="auto">
+          <a:xfrm>
+            <a:off x="1985962" y="2208257"/>
+            <a:ext cx="4935538" cy="2552656"/>
           </a:xfrm>
           <a:prstGeom prst="rect">
             <a:avLst/>
@@ -10227,7 +10291,7 @@
         <p:cNvPr id="1" name="">
           <a:extLst>
             <a:ext uri="{FF2B5EF4-FFF2-40B4-BE49-F238E27FC236}">
-              <a16:creationId xmlns:a16="http://schemas.microsoft.com/office/drawing/2014/main" xmlns="" id="{7095FE28-83D4-5A93-E6A1-1A03FB5FF633}"/>
+              <a16:creationId xmlns="" xmlns:a16="http://schemas.microsoft.com/office/drawing/2014/main" id="{7095FE28-83D4-5A93-E6A1-1A03FB5FF633}"/>
             </a:ext>
           </a:extLst>
         </p:cNvPr>
@@ -10247,7 +10311,7 @@
           <p:cNvPr id="2" name="Заголовок 1">
             <a:extLst>
               <a:ext uri="{FF2B5EF4-FFF2-40B4-BE49-F238E27FC236}">
-                <a16:creationId xmlns:a16="http://schemas.microsoft.com/office/drawing/2014/main" xmlns="" id="{1841EA04-991D-79DA-7055-72777D658D72}"/>
+                <a16:creationId xmlns="" xmlns:a16="http://schemas.microsoft.com/office/drawing/2014/main" id="{1841EA04-991D-79DA-7055-72777D658D72}"/>
               </a:ext>
             </a:extLst>
           </p:cNvPr>
@@ -10286,7 +10350,7 @@
           <p:cNvPr id="3" name="Текст 2">
             <a:extLst>
               <a:ext uri="{FF2B5EF4-FFF2-40B4-BE49-F238E27FC236}">
-                <a16:creationId xmlns:a16="http://schemas.microsoft.com/office/drawing/2014/main" xmlns="" id="{C6CEC05E-3336-74DA-70D0-3BA4EF751FA8}"/>
+                <a16:creationId xmlns="" xmlns:a16="http://schemas.microsoft.com/office/drawing/2014/main" id="{C6CEC05E-3336-74DA-70D0-3BA4EF751FA8}"/>
               </a:ext>
             </a:extLst>
           </p:cNvPr>
@@ -10321,7 +10385,7 @@
           <p:cNvPr id="7" name="Групувати 6">
             <a:extLst>
               <a:ext uri="{FF2B5EF4-FFF2-40B4-BE49-F238E27FC236}">
-                <a16:creationId xmlns:a16="http://schemas.microsoft.com/office/drawing/2014/main" xmlns="" id="{BD12B4EC-BAF3-8B04-5A8A-B70B8F5B42F0}"/>
+                <a16:creationId xmlns="" xmlns:a16="http://schemas.microsoft.com/office/drawing/2014/main" id="{BD12B4EC-BAF3-8B04-5A8A-B70B8F5B42F0}"/>
               </a:ext>
             </a:extLst>
           </p:cNvPr>
@@ -10341,7 +10405,7 @@
             <p:cNvPr id="5" name="Рисунок 4">
               <a:extLst>
                 <a:ext uri="{FF2B5EF4-FFF2-40B4-BE49-F238E27FC236}">
-                  <a16:creationId xmlns:a16="http://schemas.microsoft.com/office/drawing/2014/main" xmlns="" id="{593CE5E0-AB79-BE3E-1D98-35061B6E012F}"/>
+                  <a16:creationId xmlns="" xmlns:a16="http://schemas.microsoft.com/office/drawing/2014/main" id="{593CE5E0-AB79-BE3E-1D98-35061B6E012F}"/>
                 </a:ext>
               </a:extLst>
             </p:cNvPr>
@@ -10371,7 +10435,7 @@
             <p:cNvPr id="6" name="Прямокутник 5">
               <a:extLst>
                 <a:ext uri="{FF2B5EF4-FFF2-40B4-BE49-F238E27FC236}">
-                  <a16:creationId xmlns:a16="http://schemas.microsoft.com/office/drawing/2014/main" xmlns="" id="{E2CAAB2C-77E8-115C-865A-235A8EC5DD71}"/>
+                  <a16:creationId xmlns="" xmlns:a16="http://schemas.microsoft.com/office/drawing/2014/main" id="{E2CAAB2C-77E8-115C-865A-235A8EC5DD71}"/>
                 </a:ext>
               </a:extLst>
             </p:cNvPr>
@@ -10440,7 +10504,7 @@
         <p:cNvPr id="1" name="">
           <a:extLst>
             <a:ext uri="{FF2B5EF4-FFF2-40B4-BE49-F238E27FC236}">
-              <a16:creationId xmlns:a16="http://schemas.microsoft.com/office/drawing/2014/main" xmlns="" id="{2E7DFAB6-F9A9-A635-B71E-91ABCEDEA9EF}"/>
+              <a16:creationId xmlns="" xmlns:a16="http://schemas.microsoft.com/office/drawing/2014/main" id="{2E7DFAB6-F9A9-A635-B71E-91ABCEDEA9EF}"/>
             </a:ext>
           </a:extLst>
         </p:cNvPr>
@@ -10460,7 +10524,7 @@
           <p:cNvPr id="2" name="Заголовок 1">
             <a:extLst>
               <a:ext uri="{FF2B5EF4-FFF2-40B4-BE49-F238E27FC236}">
-                <a16:creationId xmlns:a16="http://schemas.microsoft.com/office/drawing/2014/main" xmlns="" id="{0590A747-1C43-0DD3-D404-3F06F7871F59}"/>
+                <a16:creationId xmlns="" xmlns:a16="http://schemas.microsoft.com/office/drawing/2014/main" id="{0590A747-1C43-0DD3-D404-3F06F7871F59}"/>
               </a:ext>
             </a:extLst>
           </p:cNvPr>
@@ -10499,7 +10563,7 @@
           <p:cNvPr id="3" name="Текст 2">
             <a:extLst>
               <a:ext uri="{FF2B5EF4-FFF2-40B4-BE49-F238E27FC236}">
-                <a16:creationId xmlns:a16="http://schemas.microsoft.com/office/drawing/2014/main" xmlns="" id="{2038CD81-DFA5-8E4D-085A-3521C34238F8}"/>
+                <a16:creationId xmlns="" xmlns:a16="http://schemas.microsoft.com/office/drawing/2014/main" id="{2038CD81-DFA5-8E4D-085A-3521C34238F8}"/>
               </a:ext>
             </a:extLst>
           </p:cNvPr>
@@ -10534,7 +10598,7 @@
           <p:cNvPr id="15" name="Групувати 14">
             <a:extLst>
               <a:ext uri="{FF2B5EF4-FFF2-40B4-BE49-F238E27FC236}">
-                <a16:creationId xmlns:a16="http://schemas.microsoft.com/office/drawing/2014/main" xmlns="" id="{D7405CFF-974F-4600-9865-DF726938A865}"/>
+                <a16:creationId xmlns="" xmlns:a16="http://schemas.microsoft.com/office/drawing/2014/main" id="{D7405CFF-974F-4600-9865-DF726938A865}"/>
               </a:ext>
             </a:extLst>
           </p:cNvPr>
@@ -10554,7 +10618,7 @@
             <p:cNvPr id="14" name="Рисунок 13">
               <a:extLst>
                 <a:ext uri="{FF2B5EF4-FFF2-40B4-BE49-F238E27FC236}">
-                  <a16:creationId xmlns:a16="http://schemas.microsoft.com/office/drawing/2014/main" xmlns="" id="{BE18E4ED-CEDE-ABFC-BDE1-9D14A464DD9E}"/>
+                  <a16:creationId xmlns="" xmlns:a16="http://schemas.microsoft.com/office/drawing/2014/main" id="{BE18E4ED-CEDE-ABFC-BDE1-9D14A464DD9E}"/>
                 </a:ext>
               </a:extLst>
             </p:cNvPr>
@@ -10584,7 +10648,7 @@
             <p:cNvPr id="8" name="Прямокутник 7">
               <a:extLst>
                 <a:ext uri="{FF2B5EF4-FFF2-40B4-BE49-F238E27FC236}">
-                  <a16:creationId xmlns:a16="http://schemas.microsoft.com/office/drawing/2014/main" xmlns="" id="{49949B00-0440-B611-9449-F3B4BAEA1B8D}"/>
+                  <a16:creationId xmlns="" xmlns:a16="http://schemas.microsoft.com/office/drawing/2014/main" id="{49949B00-0440-B611-9449-F3B4BAEA1B8D}"/>
                 </a:ext>
               </a:extLst>
             </p:cNvPr>
@@ -10833,7 +10897,7 @@
         <p:cNvPr id="1" name="">
           <a:extLst>
             <a:ext uri="{FF2B5EF4-FFF2-40B4-BE49-F238E27FC236}">
-              <a16:creationId xmlns:a16="http://schemas.microsoft.com/office/drawing/2014/main" xmlns="" id="{A9BD6DD5-A9A9-8E8C-8971-3304E63ED176}"/>
+              <a16:creationId xmlns="" xmlns:a16="http://schemas.microsoft.com/office/drawing/2014/main" id="{A9BD6DD5-A9A9-8E8C-8971-3304E63ED176}"/>
             </a:ext>
           </a:extLst>
         </p:cNvPr>
@@ -10853,7 +10917,7 @@
           <p:cNvPr id="2" name="Заголовок 1">
             <a:extLst>
               <a:ext uri="{FF2B5EF4-FFF2-40B4-BE49-F238E27FC236}">
-                <a16:creationId xmlns:a16="http://schemas.microsoft.com/office/drawing/2014/main" xmlns="" id="{12474D0D-E9FB-CD8D-CD30-D94A552403F8}"/>
+                <a16:creationId xmlns="" xmlns:a16="http://schemas.microsoft.com/office/drawing/2014/main" id="{12474D0D-E9FB-CD8D-CD30-D94A552403F8}"/>
               </a:ext>
             </a:extLst>
           </p:cNvPr>
@@ -10892,7 +10956,7 @@
           <p:cNvPr id="11" name="Рисунок 10">
             <a:extLst>
               <a:ext uri="{FF2B5EF4-FFF2-40B4-BE49-F238E27FC236}">
-                <a16:creationId xmlns:a16="http://schemas.microsoft.com/office/drawing/2014/main" xmlns="" id="{8F0AB251-167A-69FA-E2ED-39FA738D60B7}"/>
+                <a16:creationId xmlns="" xmlns:a16="http://schemas.microsoft.com/office/drawing/2014/main" id="{8F0AB251-167A-69FA-E2ED-39FA738D60B7}"/>
               </a:ext>
             </a:extLst>
           </p:cNvPr>
@@ -10938,7 +11002,7 @@
         <p:cNvPr id="1" name="">
           <a:extLst>
             <a:ext uri="{FF2B5EF4-FFF2-40B4-BE49-F238E27FC236}">
-              <a16:creationId xmlns:a16="http://schemas.microsoft.com/office/drawing/2014/main" xmlns="" id="{632EF2C6-81F6-DB81-3339-5DDBA487AD47}"/>
+              <a16:creationId xmlns="" xmlns:a16="http://schemas.microsoft.com/office/drawing/2014/main" id="{632EF2C6-81F6-DB81-3339-5DDBA487AD47}"/>
             </a:ext>
           </a:extLst>
         </p:cNvPr>
@@ -10958,7 +11022,7 @@
           <p:cNvPr id="2" name="Заголовок 1">
             <a:extLst>
               <a:ext uri="{FF2B5EF4-FFF2-40B4-BE49-F238E27FC236}">
-                <a16:creationId xmlns:a16="http://schemas.microsoft.com/office/drawing/2014/main" xmlns="" id="{8D54CD2D-705D-AD65-B85F-8841EF53648C}"/>
+                <a16:creationId xmlns="" xmlns:a16="http://schemas.microsoft.com/office/drawing/2014/main" id="{8D54CD2D-705D-AD65-B85F-8841EF53648C}"/>
               </a:ext>
             </a:extLst>
           </p:cNvPr>
@@ -11021,7 +11085,7 @@
           <p:cNvPr id="4" name="TextBox 3">
             <a:extLst>
               <a:ext uri="{FF2B5EF4-FFF2-40B4-BE49-F238E27FC236}">
-                <a16:creationId xmlns:a16="http://schemas.microsoft.com/office/drawing/2014/main" xmlns="" id="{630B3029-4333-9741-7921-74C47BC6F987}"/>
+                <a16:creationId xmlns="" xmlns:a16="http://schemas.microsoft.com/office/drawing/2014/main" id="{630B3029-4333-9741-7921-74C47BC6F987}"/>
               </a:ext>
             </a:extLst>
           </p:cNvPr>
@@ -11612,7 +11676,7 @@
           <p:cNvPr id="3" name="TextBox 2">
             <a:extLst>
               <a:ext uri="{FF2B5EF4-FFF2-40B4-BE49-F238E27FC236}">
-                <a16:creationId xmlns:a16="http://schemas.microsoft.com/office/drawing/2014/main" xmlns="" id="{40F8BF51-6D5A-215B-5AEE-EE819CCCE754}"/>
+                <a16:creationId xmlns="" xmlns:a16="http://schemas.microsoft.com/office/drawing/2014/main" id="{40F8BF51-6D5A-215B-5AEE-EE819CCCE754}"/>
               </a:ext>
             </a:extLst>
           </p:cNvPr>
@@ -11768,7 +11832,7 @@
         <p:cNvPr id="1" name="">
           <a:extLst>
             <a:ext uri="{FF2B5EF4-FFF2-40B4-BE49-F238E27FC236}">
-              <a16:creationId xmlns:a16="http://schemas.microsoft.com/office/drawing/2014/main" xmlns="" id="{E790B012-359F-5CD6-34FB-C895D2535137}"/>
+              <a16:creationId xmlns="" xmlns:a16="http://schemas.microsoft.com/office/drawing/2014/main" id="{E790B012-359F-5CD6-34FB-C895D2535137}"/>
             </a:ext>
           </a:extLst>
         </p:cNvPr>
@@ -11788,7 +11852,7 @@
           <p:cNvPr id="2" name="Заголовок 1">
             <a:extLst>
               <a:ext uri="{FF2B5EF4-FFF2-40B4-BE49-F238E27FC236}">
-                <a16:creationId xmlns:a16="http://schemas.microsoft.com/office/drawing/2014/main" xmlns="" id="{8AF3CFA7-CDA4-853F-EBA3-6A3D2275B2EB}"/>
+                <a16:creationId xmlns="" xmlns:a16="http://schemas.microsoft.com/office/drawing/2014/main" id="{8AF3CFA7-CDA4-853F-EBA3-6A3D2275B2EB}"/>
               </a:ext>
             </a:extLst>
           </p:cNvPr>
@@ -11856,7 +11920,7 @@
           <p:cNvPr id="4" name="TextBox 3">
             <a:extLst>
               <a:ext uri="{FF2B5EF4-FFF2-40B4-BE49-F238E27FC236}">
-                <a16:creationId xmlns:a16="http://schemas.microsoft.com/office/drawing/2014/main" xmlns="" id="{8970D586-AECC-B9D8-337B-9AFEEEC3EF68}"/>
+                <a16:creationId xmlns="" xmlns:a16="http://schemas.microsoft.com/office/drawing/2014/main" id="{8970D586-AECC-B9D8-337B-9AFEEEC3EF68}"/>
               </a:ext>
             </a:extLst>
           </p:cNvPr>

</xml_diff>